<commit_message>
Add daily presentation [2025-09-01]
</commit_message>
<xml_diff>
--- a/data/presentations/themes_presentation_2025-09-01.pptx
+++ b/data/presentations/themes_presentation_2025-09-01.pptx
@@ -9,8 +9,6 @@
     <p:sldId id="257" r:id="rId8"/>
     <p:sldId id="258" r:id="rId9"/>
     <p:sldId id="259" r:id="rId10"/>
-    <p:sldId id="260" r:id="rId11"/>
-    <p:sldId id="261" r:id="rId12"/>
   </p:sldIdLst>
   <p:sldSz cx="14630400" cy="8229600" type="screen4x3"/>
   <p:notesSz cx="6858000" cy="9144000"/>
@@ -3426,7 +3424,7 @@
               <a:rPr sz="1600">
                 <a:latin typeface="Times New Roman"/>
               </a:rPr>
-              <a:t>Financial giants JPMorgan Chase and private credit funds aggressively expand market reach.</a:t>
+              <a:t>Escalating conflict in Gaza prompts mass displacement, genocide allegations, and urgent international scrutiny.</a:t>
             </a:r>
           </a:p>
           <a:p>
@@ -3445,7 +3443,7 @@
               <a:rPr sz="1600">
                 <a:latin typeface="Times New Roman"/>
               </a:rPr>
-              <a:t>JPMorgan Chase is strategically hiring top talent to dominate key investment banking sectors, while private credit funds are attracting significant investments from wealthy individuals, offsetting institutional slowdowns and marking a new growth frontier in the financial industry.</a:t>
+              <a:t>The ongoing conflict in Gaza has intensified with increased Israeli military actions causing mass displacement and a severe humanitarian crisis, while also facing growing allegations of genocide and prompting international organizations to investigate potential war crimes.</a:t>
             </a:r>
           </a:p>
           <a:p>
@@ -3471,7 +3469,7 @@
               </a:defRPr>
             </a:pPr>
             <a:r>
-              <a:t>- JPMorgan's aggressive hiring of senior bankers to boost market share.</a:t>
+              <a:t>- Intensified Israeli military operations and Palestinian displacement</a:t>
             </a:r>
           </a:p>
           <a:p>
@@ -3484,7 +3482,7 @@
               </a:defRPr>
             </a:pPr>
             <a:r>
-              <a:t>- Surge in individual investments fueling the growth of private credit funds.</a:t>
+              <a:t>- Allegations of genocide and war crimes by Israel</a:t>
             </a:r>
           </a:p>
           <a:p>
@@ -3497,7 +3495,7 @@
               </a:defRPr>
             </a:pPr>
             <a:r>
-              <a:t>- Increased competition and potential impact on returns in the private lending market.</a:t>
+              <a:t>- Dire humanitarian conditions and famine in Gaza</a:t>
             </a:r>
           </a:p>
         </p:txBody>
@@ -3567,13 +3565,13 @@
               <a:rPr sz="1600">
                 <a:latin typeface="Times New Roman"/>
               </a:rPr>
-              <a:t>- JPMorgan Chase poaches record number of ... : </a:t>
+              <a:t>- Palestinians flee Israeli bombardment of... : </a:t>
             </a:r>
             <a:r>
               <a:rPr i="1" sz="1600">
                 <a:latin typeface="Times New Roman"/>
               </a:rPr>
-              <a:t>https://www.ft.com/content/3d613989-5662-461d-a987-49ee02ad6ca5</a:t>
+              <a:t>https://www.ft.com/content/75c1819a-9768-4914-be7f-705438c56b82</a:t>
             </a:r>
           </a:p>
           <a:p>
@@ -3582,13 +3580,28 @@
               <a:rPr sz="1600">
                 <a:latin typeface="Times New Roman"/>
               </a:rPr>
-              <a:t>- Wealthy Americans pour record sums into ... : </a:t>
+              <a:t>- Israeli campaign in Gaza meets definitio... : </a:t>
             </a:r>
             <a:r>
               <a:rPr i="1" sz="1600">
                 <a:latin typeface="Times New Roman"/>
               </a:rPr>
-              <a:t>https://www.ft.com/content/0b3cd961-f748-4c0b-8298-e9329820e244</a:t>
+              <a:t>https://www.ft.com/content/470b61ff-aa1c-487f-a9ae-477b5c142a53</a:t>
+            </a:r>
+          </a:p>
+          <a:p>
+            <a:pPr lvl="1"/>
+            <a:r>
+              <a:rPr sz="1600">
+                <a:latin typeface="Times New Roman"/>
+              </a:rPr>
+              <a:t>- Powerful earthquake hits Afghanistan... : </a:t>
+            </a:r>
+            <a:r>
+              <a:rPr i="1" sz="1600">
+                <a:latin typeface="Times New Roman"/>
+              </a:rPr>
+              <a:t>https://www.ft.com/content/eb4b7299-e5c2-44f6-92a4-8dd3229e5d17</a:t>
             </a:r>
           </a:p>
         </p:txBody>
@@ -3809,7 +3822,7 @@
               <a:rPr sz="1600">
                 <a:latin typeface="Times New Roman"/>
               </a:rPr>
-              <a:t>Geopolitical Tensions Rise as Iran, Venezuela, and Gaza Face Internal and External Pressures</a:t>
+              <a:t>UK Politics Grapples with Immigration, Economic Strategies, and Party Reshuffles Amidst Shifting Polls</a:t>
             </a:r>
           </a:p>
           <a:p>
@@ -3828,7 +3841,7 @@
               <a:rPr sz="1600">
                 <a:latin typeface="Times New Roman"/>
               </a:rPr>
-              <a:t>Several regions are experiencing escalating tensions due to a combination of internal challenges and external pressures. Iran grapples with internal legitimacy issues and external military threats, Venezuela faces potential US intervention, and Gaza endures intensified Israeli bombardment, leading to dire humanitarian crises and displacement.</a:t>
+              <a:t>The UK political landscape is currently defined by pressures on immigration policy amidst rising anti-immigration sentiment and controversies, alongside debates around economic strategies involving fiscal rules, taxation, and central bank influence, while various parties undergo reshuffles and adjustments in leadership and policy stances in response to evolving public opinion and economic challenges.</a:t>
             </a:r>
           </a:p>
           <a:p>
@@ -3854,7 +3867,7 @@
               </a:defRPr>
             </a:pPr>
             <a:r>
-              <a:t>- Iran's internal struggles and response to external threats.</a:t>
+              <a:t>- Immigration policy and the challenges of managing small boat arrivals</a:t>
             </a:r>
           </a:p>
           <a:p>
@@ -3867,7 +3880,7 @@
               </a:defRPr>
             </a:pPr>
             <a:r>
-              <a:t>- Venezuela's confrontation with the US and the potential for intervention.</a:t>
+              <a:t>- Economic policy debates surrounding fiscal rules, taxation, and growth</a:t>
             </a:r>
           </a:p>
           <a:p>
@@ -3880,7 +3893,7 @@
               </a:defRPr>
             </a:pPr>
             <a:r>
-              <a:t>- Escalating violence and humanitarian crisis in Gaza.</a:t>
+              <a:t>- Party reshuffles and adjustments in leadership and strategy</a:t>
             </a:r>
           </a:p>
         </p:txBody>
@@ -3950,13 +3963,13 @@
               <a:rPr sz="1600">
                 <a:latin typeface="Times New Roman"/>
               </a:rPr>
-              <a:t>- Iran’s new nationalism won’t give its le... : </a:t>
+              <a:t>- Crossings of small boats to UK in August... : </a:t>
             </a:r>
             <a:r>
               <a:rPr i="1" sz="1600">
                 <a:latin typeface="Times New Roman"/>
               </a:rPr>
-              <a:t>https://www.ft.com/content/e8e945b2-a473-4a0a-8723-37330eb21b9c</a:t>
+              <a:t>https://www.ft.com/content/4a6d51d5-02c1-4ce6-8e18-fa4c40a8b938</a:t>
             </a:r>
           </a:p>
           <a:p>
@@ -3965,13 +3978,13 @@
               <a:rPr sz="1600">
                 <a:latin typeface="Times New Roman"/>
               </a:rPr>
-              <a:t>- Is Trump’s mission in Venezuela to fight... : </a:t>
+              <a:t>- Royal Mail returns to profit for first t... : </a:t>
             </a:r>
             <a:r>
               <a:rPr i="1" sz="1600">
                 <a:latin typeface="Times New Roman"/>
               </a:rPr>
-              <a:t>https://www.ft.com/content/66251e3a-662e-4427-904d-2dc4304c36b5</a:t>
+              <a:t>https://www.ft.com/content/efcbdba8-bbd1-4651-811e-e55676cfd519</a:t>
             </a:r>
           </a:p>
           <a:p>
@@ -3980,13 +3993,13 @@
               <a:rPr sz="1600">
                 <a:latin typeface="Times New Roman"/>
               </a:rPr>
-              <a:t>- Palestinians flee Israeli bombardment of... : </a:t>
+              <a:t>- Reform UK calls for end to ‘egregious’ c... : </a:t>
             </a:r>
             <a:r>
               <a:rPr i="1" sz="1600">
                 <a:latin typeface="Times New Roman"/>
               </a:rPr>
-              <a:t>https://www.ft.com/content/75c1819a-9768-4914-be7f-705438c56b82</a:t>
+              <a:t>https://www.ft.com/content/f325a41d-bd4d-45a4-9159-0ff76471c823</a:t>
             </a:r>
           </a:p>
         </p:txBody>
@@ -4207,7 +4220,7 @@
               <a:rPr sz="1600">
                 <a:latin typeface="Times New Roman"/>
               </a:rPr>
-              <a:t>Global Economy Faces Headwinds from Trade Wars, Policy Shifts, and Technological Disruption</a:t>
+              <a:t>Global Events Trigger Political and Economic Instability Across Nations</a:t>
             </a:r>
           </a:p>
           <a:p>
@@ -4226,7 +4239,7 @@
               <a:rPr sz="1600">
                 <a:latin typeface="Times New Roman"/>
               </a:rPr>
-              <a:t>The global economy is navigating increasing challenges, including trade wars initiated by the Trump administration, shifts in immigration and economic policies affecting labor markets, and the disruptive potential of artificial intelligence. These forces are creating economic uncertainty and pressuring businesses across multiple sectors, from agriculture and manufacturing to shipping and finance.</a:t>
+              <a:t>A confluence of factors including controversial government policies, trade wars, and geopolitical tensions are sparking political unrest, economic uncertainty, and shifts in global power dynamics across various countries.</a:t>
             </a:r>
           </a:p>
           <a:p>
@@ -4252,7 +4265,7 @@
               </a:defRPr>
             </a:pPr>
             <a:r>
-              <a:t>- Impact of immigration policy changes on labor markets</a:t>
+              <a:t>- Political turmoil and protests against government policies in Indonesia and France</a:t>
             </a:r>
           </a:p>
           <a:p>
@@ -4265,7 +4278,7 @@
               </a:defRPr>
             </a:pPr>
             <a:r>
-              <a:t>- Financial risks and regulation in the face of increasing global debt</a:t>
+              <a:t>- Impact of Donald Trump's policies and trade wars on international relations and economic stability</a:t>
             </a:r>
           </a:p>
           <a:p>
@@ -4278,7 +4291,7 @@
               </a:defRPr>
             </a:pPr>
             <a:r>
-              <a:t>- Economic implications of artificial intelligence and automation</a:t>
+              <a:t>- China's increasing global influence amid US policy shifts</a:t>
             </a:r>
           </a:p>
         </p:txBody>
@@ -4348,13 +4361,13 @@
               <a:rPr sz="1600">
                 <a:latin typeface="Times New Roman"/>
               </a:rPr>
-              <a:t>- Wisconsin meatpackers face labour shorta... : </a:t>
+              <a:t>- FirstFT: Indonesian finance minister’s h... : </a:t>
             </a:r>
             <a:r>
               <a:rPr i="1" sz="1600">
                 <a:latin typeface="Times New Roman"/>
               </a:rPr>
-              <a:t>https://www.ft.com/content/f055fee3-87b0-4ca0-af5a-ea964a6c6d21</a:t>
+              <a:t>https://www.ft.com/content/d09b4eb5-6e27-4ed7-b954-25950d6af40b</a:t>
             </a:r>
           </a:p>
           <a:p>
@@ -4363,13 +4376,13 @@
               <a:rPr sz="1600">
                 <a:latin typeface="Times New Roman"/>
               </a:rPr>
-              <a:t>- Shipping companies seek non-Chinese fina... : </a:t>
+              <a:t>- Crunch time for US economic institutions... : </a:t>
             </a:r>
             <a:r>
               <a:rPr i="1" sz="1600">
                 <a:latin typeface="Times New Roman"/>
               </a:rPr>
-              <a:t>https://www.ft.com/content/0464fa65-3e0e-4e08-9eb4-09c054bcf720</a:t>
+              <a:t>https://www.ft.com/content/34f41017-ebe9-42fa-867f-dd38c2706b60</a:t>
             </a:r>
           </a:p>
           <a:p>
@@ -4378,809 +4391,13 @@
               <a:rPr sz="1600">
                 <a:latin typeface="Times New Roman"/>
               </a:rPr>
-              <a:t>- Will the next US jobs report make a Fed ... : </a:t>
+              <a:t>- Apollo bust-up heads to New York trial... : </a:t>
             </a:r>
             <a:r>
               <a:rPr i="1" sz="1600">
                 <a:latin typeface="Times New Roman"/>
               </a:rPr>
-              <a:t>https://www.ft.com/content/62fc0f17-2ac5-4024-8a1d-f807a4d7b668</a:t>
-            </a:r>
-          </a:p>
-        </p:txBody>
-      </p:sp>
-    </p:spTree>
-  </p:cSld>
-  <p:clrMapOvr>
-    <a:masterClrMapping/>
-  </p:clrMapOvr>
-</p:sld>
-</file>
-
-<file path=ppt/slides/slide5.xml><?xml version="1.0" encoding="utf-8"?>
-<p:sld xmlns:a="http://schemas.openxmlformats.org/drawingml/2006/main" xmlns:p="http://schemas.openxmlformats.org/presentationml/2006/main" xmlns:r="http://schemas.openxmlformats.org/officeDocument/2006/relationships">
-  <p:cSld>
-    <p:bg>
-      <p:bgPr>
-        <a:solidFill>
-          <a:srgbClr val="FFF1E5"/>
-        </a:solidFill>
-        <a:effectLst/>
-      </p:bgPr>
-    </p:bg>
-    <p:spTree>
-      <p:nvGrpSpPr>
-        <p:cNvPr id="1" name=""/>
-        <p:cNvGrpSpPr/>
-        <p:nvPr/>
-      </p:nvGrpSpPr>
-      <p:grpSpPr/>
-      <p:pic>
-        <p:nvPicPr>
-          <p:cNvPr id="3" name="Picture 2" descr="ft_logo.png"/>
-          <p:cNvPicPr>
-            <a:picLocks noChangeAspect="1"/>
-          </p:cNvPicPr>
-          <p:nvPr/>
-        </p:nvPicPr>
-        <p:blipFill>
-          <a:blip r:embed="rId2"/>
-          <a:stretch>
-            <a:fillRect/>
-          </a:stretch>
-        </p:blipFill>
-        <p:spPr>
-          <a:xfrm>
-            <a:off x="457200" y="164592"/>
-            <a:ext cx="200791" cy="274320"/>
-          </a:xfrm>
-          <a:prstGeom prst="rect">
-            <a:avLst/>
-          </a:prstGeom>
-        </p:spPr>
-      </p:pic>
-      <p:sp>
-        <p:nvSpPr>
-          <p:cNvPr id="4" name="Rectangle 3"/>
-          <p:cNvSpPr/>
-          <p:nvPr/>
-        </p:nvSpPr>
-        <p:spPr>
-          <a:xfrm>
-            <a:off x="777240" y="164592"/>
-            <a:ext cx="27432" cy="274320"/>
-          </a:xfrm>
-          <a:prstGeom prst="rect">
-            <a:avLst/>
-          </a:prstGeom>
-          <a:solidFill>
-            <a:srgbClr val="000000"/>
-          </a:solidFill>
-          <a:ln>
-            <a:noFill/>
-          </a:ln>
-        </p:spPr>
-        <p:style>
-          <a:lnRef idx="1">
-            <a:schemeClr val="accent1"/>
-          </a:lnRef>
-          <a:fillRef idx="3">
-            <a:schemeClr val="accent1"/>
-          </a:fillRef>
-          <a:effectRef idx="2">
-            <a:schemeClr val="accent1"/>
-          </a:effectRef>
-          <a:fontRef idx="minor">
-            <a:schemeClr val="lt1"/>
-          </a:fontRef>
-        </p:style>
-        <p:txBody>
-          <a:bodyPr rtlCol="0" anchor="ctr"/>
-          <a:lstStyle/>
-          <a:p>
-            <a:pPr algn="ctr"/>
-          </a:p>
-        </p:txBody>
-      </p:sp>
-      <p:sp>
-        <p:nvSpPr>
-          <p:cNvPr id="5" name="TextBox 4"/>
-          <p:cNvSpPr txBox="1"/>
-          <p:nvPr/>
-        </p:nvSpPr>
-        <p:spPr>
-          <a:xfrm>
-            <a:off x="841248" y="-182880"/>
-            <a:ext cx="2834640" cy="521207"/>
-          </a:xfrm>
-          <a:prstGeom prst="rect">
-            <a:avLst/>
-          </a:prstGeom>
-          <a:noFill/>
-        </p:spPr>
-        <p:txBody>
-          <a:bodyPr wrap="square">
-            <a:spAutoFit/>
-          </a:bodyPr>
-          <a:lstStyle/>
-          <a:p/>
-          <a:p>
-            <a:pPr algn="l"/>
-            <a:r>
-              <a:rPr b="1" sz="1600">
-                <a:latin typeface="Times New Roman"/>
-              </a:rPr>
-              <a:t>Financial Times Summary</a:t>
-            </a:r>
-          </a:p>
-          <a:p>
-            <a:pPr algn="l"/>
-            <a:r>
-              <a:rPr sz="800">
-                <a:latin typeface="Times New Roman"/>
-              </a:rPr>
-              <a:t>2025/09/01</a:t>
-            </a:r>
-          </a:p>
-        </p:txBody>
-      </p:sp>
-      <p:sp>
-        <p:nvSpPr>
-          <p:cNvPr id="6" name="Rectangle 5"/>
-          <p:cNvSpPr/>
-          <p:nvPr/>
-        </p:nvSpPr>
-        <p:spPr>
-          <a:xfrm>
-            <a:off x="0" y="640080"/>
-            <a:ext cx="14612112" cy="45720"/>
-          </a:xfrm>
-          <a:prstGeom prst="rect">
-            <a:avLst/>
-          </a:prstGeom>
-          <a:solidFill>
-            <a:srgbClr val="000000"/>
-          </a:solidFill>
-          <a:ln>
-            <a:noFill/>
-          </a:ln>
-        </p:spPr>
-        <p:style>
-          <a:lnRef idx="1">
-            <a:schemeClr val="accent1"/>
-          </a:lnRef>
-          <a:fillRef idx="3">
-            <a:schemeClr val="accent1"/>
-          </a:fillRef>
-          <a:effectRef idx="2">
-            <a:schemeClr val="accent1"/>
-          </a:effectRef>
-          <a:fontRef idx="minor">
-            <a:schemeClr val="lt1"/>
-          </a:fontRef>
-        </p:style>
-        <p:txBody>
-          <a:bodyPr rtlCol="0" anchor="ctr"/>
-          <a:lstStyle/>
-          <a:p>
-            <a:pPr algn="ctr"/>
-          </a:p>
-        </p:txBody>
-      </p:sp>
-      <p:sp>
-        <p:nvSpPr>
-          <p:cNvPr id="7" name="TextBox 6"/>
-          <p:cNvSpPr txBox="1"/>
-          <p:nvPr/>
-        </p:nvSpPr>
-        <p:spPr>
-          <a:xfrm>
-            <a:off x="365760" y="640080"/>
-            <a:ext cx="13716000" cy="3200400"/>
-          </a:xfrm>
-          <a:prstGeom prst="rect">
-            <a:avLst/>
-          </a:prstGeom>
-          <a:noFill/>
-        </p:spPr>
-        <p:txBody>
-          <a:bodyPr wrap="square">
-            <a:spAutoFit/>
-          </a:bodyPr>
-          <a:lstStyle/>
-          <a:p/>
-          <a:p>
-            <a:pPr>
-              <a:spcAft>
-                <a:spcPts val="1200"/>
-              </a:spcAft>
-            </a:pPr>
-            <a:r>
-              <a:rPr b="1" sz="1600">
-                <a:latin typeface="Times New Roman"/>
-              </a:rPr>
-              <a:t>Headline : </a:t>
-            </a:r>
-            <a:r>
-              <a:rPr sz="1600">
-                <a:latin typeface="Times New Roman"/>
-              </a:rPr>
-              <a:t>Entrepreneurs Find Success Innovating in Niche Markets and Balancing Heritage with Expansion</a:t>
-            </a:r>
-          </a:p>
-          <a:p>
-            <a:pPr>
-              <a:spcAft>
-                <a:spcPts val="1200"/>
-              </a:spcAft>
-            </a:pPr>
-            <a:r>
-              <a:rPr b="1" sz="1600">
-                <a:latin typeface="Times New Roman"/>
-              </a:rPr>
-              <a:t>Main Idea : </a:t>
-            </a:r>
-            <a:r>
-              <a:rPr sz="1600">
-                <a:latin typeface="Times New Roman"/>
-              </a:rPr>
-              <a:t>Innovative entrepreneurs are carving out successful businesses by identifying unmet needs and building strong brands. They face challenges like scaling production, managing growth, balancing tradition with expansion, and maintaining brand integrity in competitive markets.</a:t>
-            </a:r>
-          </a:p>
-          <a:p>
-            <a:pPr>
-              <a:spcAft>
-                <a:spcPts val="600"/>
-              </a:spcAft>
-            </a:pPr>
-            <a:r>
-              <a:rPr b="1" sz="1600">
-                <a:latin typeface="Times New Roman"/>
-              </a:rPr>
-              <a:t>Subtopics :</a:t>
-            </a:r>
-          </a:p>
-          <a:p>
-            <a:pPr lvl="1">
-              <a:spcAft>
-                <a:spcPts val="600"/>
-              </a:spcAft>
-              <a:defRPr sz="1600">
-                <a:latin typeface="Times New Roman"/>
-              </a:defRPr>
-            </a:pPr>
-            <a:r>
-              <a:t>- Identifying and capitalizing on niche markets.</a:t>
-            </a:r>
-          </a:p>
-          <a:p>
-            <a:pPr lvl="1">
-              <a:spcAft>
-                <a:spcPts val="600"/>
-              </a:spcAft>
-              <a:defRPr sz="1600">
-                <a:latin typeface="Times New Roman"/>
-              </a:defRPr>
-            </a:pPr>
-            <a:r>
-              <a:t>- Challenges of scaling production and brand management.</a:t>
-            </a:r>
-          </a:p>
-          <a:p>
-            <a:pPr lvl="1">
-              <a:spcAft>
-                <a:spcPts val="600"/>
-              </a:spcAft>
-              <a:defRPr sz="1600">
-                <a:latin typeface="Times New Roman"/>
-              </a:defRPr>
-            </a:pPr>
-            <a:r>
-              <a:t>- Balancing heritage and tradition with expansion and innovation.</a:t>
-            </a:r>
-          </a:p>
-        </p:txBody>
-      </p:sp>
-      <p:pic>
-        <p:nvPicPr>
-          <p:cNvPr id="8" name="Picture 7" descr="image.png"/>
-          <p:cNvPicPr>
-            <a:picLocks noChangeAspect="1"/>
-          </p:cNvPicPr>
-          <p:nvPr/>
-        </p:nvPicPr>
-        <p:blipFill>
-          <a:blip r:embed="rId3"/>
-          <a:stretch>
-            <a:fillRect/>
-          </a:stretch>
-        </p:blipFill>
-        <p:spPr>
-          <a:xfrm>
-            <a:off x="5422392" y="3840480"/>
-            <a:ext cx="4133087" cy="2743200"/>
-          </a:xfrm>
-          <a:prstGeom prst="rect">
-            <a:avLst/>
-          </a:prstGeom>
-          <a:ln w="25400">
-            <a:solidFill>
-              <a:srgbClr val="000000"/>
-            </a:solidFill>
-          </a:ln>
-        </p:spPr>
-      </p:pic>
-      <p:sp>
-        <p:nvSpPr>
-          <p:cNvPr id="9" name="TextBox 8"/>
-          <p:cNvSpPr txBox="1"/>
-          <p:nvPr/>
-        </p:nvSpPr>
-        <p:spPr>
-          <a:xfrm>
-            <a:off x="365760" y="6583680"/>
-            <a:ext cx="13716000" cy="1828800"/>
-          </a:xfrm>
-          <a:prstGeom prst="rect">
-            <a:avLst/>
-          </a:prstGeom>
-          <a:noFill/>
-        </p:spPr>
-        <p:txBody>
-          <a:bodyPr wrap="square">
-            <a:spAutoFit/>
-          </a:bodyPr>
-          <a:lstStyle/>
-          <a:p/>
-          <a:p>
-            <a:r>
-              <a:rPr b="1" sz="1600">
-                <a:latin typeface="Times New Roman"/>
-              </a:rPr>
-              <a:t>References :</a:t>
-            </a:r>
-          </a:p>
-          <a:p>
-            <a:pPr lvl="1"/>
-            <a:r>
-              <a:rPr sz="1600">
-                <a:latin typeface="Times New Roman"/>
-              </a:rPr>
-              <a:t>- Dryrobe CEO Gideon Bright: ‘I wear it pr... : </a:t>
-            </a:r>
-            <a:r>
-              <a:rPr i="1" sz="1600">
-                <a:latin typeface="Times New Roman"/>
-              </a:rPr>
-              <a:t>https://www.ft.com/content/cbdc16e0-b697-4ae9-b2c1-ff19da5995e0</a:t>
-            </a:r>
-          </a:p>
-          <a:p>
-            <a:pPr lvl="1"/>
-            <a:r>
-              <a:rPr sz="1600">
-                <a:latin typeface="Times New Roman"/>
-              </a:rPr>
-              <a:t>- Marshall plan: rock n’ roll amp brand ai... : </a:t>
-            </a:r>
-            <a:r>
-              <a:rPr i="1" sz="1600">
-                <a:latin typeface="Times New Roman"/>
-              </a:rPr>
-              <a:t>https://www.ft.com/content/108a309d-c281-4d5d-a762-739853196821</a:t>
-            </a:r>
-          </a:p>
-          <a:p>
-            <a:pPr lvl="1"/>
-            <a:r>
-              <a:rPr sz="1600">
-                <a:latin typeface="Times New Roman"/>
-              </a:rPr>
-              <a:t>- How FT readers are faring in the Footbal... : </a:t>
-            </a:r>
-            <a:r>
-              <a:rPr i="1" sz="1600">
-                <a:latin typeface="Times New Roman"/>
-              </a:rPr>
-              <a:t>https://www.ft.com/content/ee5b2444-9b20-4a38-81a8-6cbe3bf3df2a</a:t>
-            </a:r>
-          </a:p>
-        </p:txBody>
-      </p:sp>
-    </p:spTree>
-  </p:cSld>
-  <p:clrMapOvr>
-    <a:masterClrMapping/>
-  </p:clrMapOvr>
-</p:sld>
-</file>
-
-<file path=ppt/slides/slide6.xml><?xml version="1.0" encoding="utf-8"?>
-<p:sld xmlns:a="http://schemas.openxmlformats.org/drawingml/2006/main" xmlns:p="http://schemas.openxmlformats.org/presentationml/2006/main" xmlns:r="http://schemas.openxmlformats.org/officeDocument/2006/relationships">
-  <p:cSld>
-    <p:bg>
-      <p:bgPr>
-        <a:solidFill>
-          <a:srgbClr val="FFF1E5"/>
-        </a:solidFill>
-        <a:effectLst/>
-      </p:bgPr>
-    </p:bg>
-    <p:spTree>
-      <p:nvGrpSpPr>
-        <p:cNvPr id="1" name=""/>
-        <p:cNvGrpSpPr/>
-        <p:nvPr/>
-      </p:nvGrpSpPr>
-      <p:grpSpPr/>
-      <p:pic>
-        <p:nvPicPr>
-          <p:cNvPr id="3" name="Picture 2" descr="ft_logo.png"/>
-          <p:cNvPicPr>
-            <a:picLocks noChangeAspect="1"/>
-          </p:cNvPicPr>
-          <p:nvPr/>
-        </p:nvPicPr>
-        <p:blipFill>
-          <a:blip r:embed="rId2"/>
-          <a:stretch>
-            <a:fillRect/>
-          </a:stretch>
-        </p:blipFill>
-        <p:spPr>
-          <a:xfrm>
-            <a:off x="457200" y="164592"/>
-            <a:ext cx="200791" cy="274320"/>
-          </a:xfrm>
-          <a:prstGeom prst="rect">
-            <a:avLst/>
-          </a:prstGeom>
-        </p:spPr>
-      </p:pic>
-      <p:sp>
-        <p:nvSpPr>
-          <p:cNvPr id="4" name="Rectangle 3"/>
-          <p:cNvSpPr/>
-          <p:nvPr/>
-        </p:nvSpPr>
-        <p:spPr>
-          <a:xfrm>
-            <a:off x="777240" y="164592"/>
-            <a:ext cx="27432" cy="274320"/>
-          </a:xfrm>
-          <a:prstGeom prst="rect">
-            <a:avLst/>
-          </a:prstGeom>
-          <a:solidFill>
-            <a:srgbClr val="000000"/>
-          </a:solidFill>
-          <a:ln>
-            <a:noFill/>
-          </a:ln>
-        </p:spPr>
-        <p:style>
-          <a:lnRef idx="1">
-            <a:schemeClr val="accent1"/>
-          </a:lnRef>
-          <a:fillRef idx="3">
-            <a:schemeClr val="accent1"/>
-          </a:fillRef>
-          <a:effectRef idx="2">
-            <a:schemeClr val="accent1"/>
-          </a:effectRef>
-          <a:fontRef idx="minor">
-            <a:schemeClr val="lt1"/>
-          </a:fontRef>
-        </p:style>
-        <p:txBody>
-          <a:bodyPr rtlCol="0" anchor="ctr"/>
-          <a:lstStyle/>
-          <a:p>
-            <a:pPr algn="ctr"/>
-          </a:p>
-        </p:txBody>
-      </p:sp>
-      <p:sp>
-        <p:nvSpPr>
-          <p:cNvPr id="5" name="TextBox 4"/>
-          <p:cNvSpPr txBox="1"/>
-          <p:nvPr/>
-        </p:nvSpPr>
-        <p:spPr>
-          <a:xfrm>
-            <a:off x="841248" y="-182880"/>
-            <a:ext cx="2834640" cy="521207"/>
-          </a:xfrm>
-          <a:prstGeom prst="rect">
-            <a:avLst/>
-          </a:prstGeom>
-          <a:noFill/>
-        </p:spPr>
-        <p:txBody>
-          <a:bodyPr wrap="square">
-            <a:spAutoFit/>
-          </a:bodyPr>
-          <a:lstStyle/>
-          <a:p/>
-          <a:p>
-            <a:pPr algn="l"/>
-            <a:r>
-              <a:rPr b="1" sz="1600">
-                <a:latin typeface="Times New Roman"/>
-              </a:rPr>
-              <a:t>Financial Times Summary</a:t>
-            </a:r>
-          </a:p>
-          <a:p>
-            <a:pPr algn="l"/>
-            <a:r>
-              <a:rPr sz="800">
-                <a:latin typeface="Times New Roman"/>
-              </a:rPr>
-              <a:t>2025/09/01</a:t>
-            </a:r>
-          </a:p>
-        </p:txBody>
-      </p:sp>
-      <p:sp>
-        <p:nvSpPr>
-          <p:cNvPr id="6" name="Rectangle 5"/>
-          <p:cNvSpPr/>
-          <p:nvPr/>
-        </p:nvSpPr>
-        <p:spPr>
-          <a:xfrm>
-            <a:off x="0" y="640080"/>
-            <a:ext cx="14612112" cy="45720"/>
-          </a:xfrm>
-          <a:prstGeom prst="rect">
-            <a:avLst/>
-          </a:prstGeom>
-          <a:solidFill>
-            <a:srgbClr val="000000"/>
-          </a:solidFill>
-          <a:ln>
-            <a:noFill/>
-          </a:ln>
-        </p:spPr>
-        <p:style>
-          <a:lnRef idx="1">
-            <a:schemeClr val="accent1"/>
-          </a:lnRef>
-          <a:fillRef idx="3">
-            <a:schemeClr val="accent1"/>
-          </a:fillRef>
-          <a:effectRef idx="2">
-            <a:schemeClr val="accent1"/>
-          </a:effectRef>
-          <a:fontRef idx="minor">
-            <a:schemeClr val="lt1"/>
-          </a:fontRef>
-        </p:style>
-        <p:txBody>
-          <a:bodyPr rtlCol="0" anchor="ctr"/>
-          <a:lstStyle/>
-          <a:p>
-            <a:pPr algn="ctr"/>
-          </a:p>
-        </p:txBody>
-      </p:sp>
-      <p:sp>
-        <p:nvSpPr>
-          <p:cNvPr id="7" name="TextBox 6"/>
-          <p:cNvSpPr txBox="1"/>
-          <p:nvPr/>
-        </p:nvSpPr>
-        <p:spPr>
-          <a:xfrm>
-            <a:off x="365760" y="640080"/>
-            <a:ext cx="13716000" cy="3200400"/>
-          </a:xfrm>
-          <a:prstGeom prst="rect">
-            <a:avLst/>
-          </a:prstGeom>
-          <a:noFill/>
-        </p:spPr>
-        <p:txBody>
-          <a:bodyPr wrap="square">
-            <a:spAutoFit/>
-          </a:bodyPr>
-          <a:lstStyle/>
-          <a:p/>
-          <a:p>
-            <a:pPr>
-              <a:spcAft>
-                <a:spcPts val="1200"/>
-              </a:spcAft>
-            </a:pPr>
-            <a:r>
-              <a:rPr b="1" sz="1600">
-                <a:latin typeface="Times New Roman"/>
-              </a:rPr>
-              <a:t>Headline : </a:t>
-            </a:r>
-            <a:r>
-              <a:rPr sz="1600">
-                <a:latin typeface="Times New Roman"/>
-              </a:rPr>
-              <a:t>Governments and Industries React to Shifting Economic Landscapes: Tax Reforms, Digital Currencies, and Luxury Consumption</a:t>
-            </a:r>
-          </a:p>
-          <a:p>
-            <a:pPr>
-              <a:spcAft>
-                <a:spcPts val="1200"/>
-              </a:spcAft>
-            </a:pPr>
-            <a:r>
-              <a:rPr b="1" sz="1600">
-                <a:latin typeface="Times New Roman"/>
-              </a:rPr>
-              <a:t>Main Idea : </a:t>
-            </a:r>
-            <a:r>
-              <a:rPr sz="1600">
-                <a:latin typeface="Times New Roman"/>
-              </a:rPr>
-              <a:t>Governments globally are grappling with fiscal challenges and the implications of emerging financial technologies like stablecoins, while industries adapt to shifts in consumer behavior driven by the rise of digital assets and new wealth demographics. This includes considerations of tax reforms, responses to digital currency adoption, and the luxury travel sector catering to crypto-affluent clients.</a:t>
-            </a:r>
-          </a:p>
-          <a:p>
-            <a:pPr>
-              <a:spcAft>
-                <a:spcPts val="600"/>
-              </a:spcAft>
-            </a:pPr>
-            <a:r>
-              <a:rPr b="1" sz="1600">
-                <a:latin typeface="Times New Roman"/>
-              </a:rPr>
-              <a:t>Subtopics :</a:t>
-            </a:r>
-          </a:p>
-          <a:p>
-            <a:pPr lvl="1">
-              <a:spcAft>
-                <a:spcPts val="600"/>
-              </a:spcAft>
-              <a:defRPr sz="1600">
-                <a:latin typeface="Times New Roman"/>
-              </a:defRPr>
-            </a:pPr>
-            <a:r>
-              <a:t>- Potential tax reforms to address fairness and revenue generation</a:t>
-            </a:r>
-          </a:p>
-          <a:p>
-            <a:pPr lvl="1">
-              <a:spcAft>
-                <a:spcPts val="600"/>
-              </a:spcAft>
-              <a:defRPr sz="1600">
-                <a:latin typeface="Times New Roman"/>
-              </a:defRPr>
-            </a:pPr>
-            <a:r>
-              <a:t>- The impact of stablecoins on monetary policy and payment systems</a:t>
-            </a:r>
-          </a:p>
-          <a:p>
-            <a:pPr lvl="1">
-              <a:spcAft>
-                <a:spcPts val="600"/>
-              </a:spcAft>
-              <a:defRPr sz="1600">
-                <a:latin typeface="Times New Roman"/>
-              </a:defRPr>
-            </a:pPr>
-            <a:r>
-              <a:t>- Luxury travel operators adopting cryptocurrency payments for wealthy clients</a:t>
-            </a:r>
-          </a:p>
-        </p:txBody>
-      </p:sp>
-      <p:pic>
-        <p:nvPicPr>
-          <p:cNvPr id="8" name="Picture 7" descr="image.png"/>
-          <p:cNvPicPr>
-            <a:picLocks noChangeAspect="1"/>
-          </p:cNvPicPr>
-          <p:nvPr/>
-        </p:nvPicPr>
-        <p:blipFill>
-          <a:blip r:embed="rId3"/>
-          <a:stretch>
-            <a:fillRect/>
-          </a:stretch>
-        </p:blipFill>
-        <p:spPr>
-          <a:xfrm>
-            <a:off x="5422392" y="3840480"/>
-            <a:ext cx="4133087" cy="2743200"/>
-          </a:xfrm>
-          <a:prstGeom prst="rect">
-            <a:avLst/>
-          </a:prstGeom>
-          <a:ln w="25400">
-            <a:solidFill>
-              <a:srgbClr val="000000"/>
-            </a:solidFill>
-          </a:ln>
-        </p:spPr>
-      </p:pic>
-      <p:sp>
-        <p:nvSpPr>
-          <p:cNvPr id="9" name="TextBox 8"/>
-          <p:cNvSpPr txBox="1"/>
-          <p:nvPr/>
-        </p:nvSpPr>
-        <p:spPr>
-          <a:xfrm>
-            <a:off x="365760" y="6583680"/>
-            <a:ext cx="13716000" cy="1828800"/>
-          </a:xfrm>
-          <a:prstGeom prst="rect">
-            <a:avLst/>
-          </a:prstGeom>
-          <a:noFill/>
-        </p:spPr>
-        <p:txBody>
-          <a:bodyPr wrap="square">
-            <a:spAutoFit/>
-          </a:bodyPr>
-          <a:lstStyle/>
-          <a:p/>
-          <a:p>
-            <a:r>
-              <a:rPr b="1" sz="1600">
-                <a:latin typeface="Times New Roman"/>
-              </a:rPr>
-              <a:t>References :</a:t>
-            </a:r>
-          </a:p>
-          <a:p>
-            <a:pPr lvl="1"/>
-            <a:r>
-              <a:rPr sz="1600">
-                <a:latin typeface="Times New Roman"/>
-              </a:rPr>
-              <a:t>- Britain needs a wealth tax on property... : </a:t>
-            </a:r>
-            <a:r>
-              <a:rPr i="1" sz="1600">
-                <a:latin typeface="Times New Roman"/>
-              </a:rPr>
-              <a:t>https://www.ft.com/content/bb4e7566-4bc6-45c9-87e4-271cc40c66a5</a:t>
-            </a:r>
-          </a:p>
-          <a:p>
-            <a:pPr lvl="1"/>
-            <a:r>
-              <a:rPr sz="1600">
-                <a:latin typeface="Times New Roman"/>
-              </a:rPr>
-              <a:t>- Stablecoins will force finance to modern... : </a:t>
-            </a:r>
-            <a:r>
-              <a:rPr i="1" sz="1600">
-                <a:latin typeface="Times New Roman"/>
-              </a:rPr>
-              <a:t>https://www.ft.com/content/72aa6431-366b-4409-b3ce-9a99d661473d</a:t>
-            </a:r>
-          </a:p>
-          <a:p>
-            <a:pPr lvl="1"/>
-            <a:r>
-              <a:rPr sz="1600">
-                <a:latin typeface="Times New Roman"/>
-              </a:rPr>
-              <a:t>- Bitcoin boom sees newly wealthy splurgin... : </a:t>
-            </a:r>
-            <a:r>
-              <a:rPr i="1" sz="1600">
-                <a:latin typeface="Times New Roman"/>
-              </a:rPr>
-              <a:t>https://www.ft.com/content/da4e36d8-fb82-454f-8448-4db0752ffa68</a:t>
+              <a:t>https://www.ft.com/content/f4ba359d-8d56-44c2-aed5-730ff644e217</a:t>
             </a:r>
           </a:p>
         </p:txBody>

</xml_diff>